<commit_message>
Update link for GitHub repo
</commit_message>
<xml_diff>
--- a/2019 Nov - Blazor Sneak Peek/slides.pptx
+++ b/2019 Nov - Blazor Sneak Peek/slides.pptx
@@ -136,6 +136,9 @@
 
 <file path=ppt/changesInfos/changesInfo1.xml><?xml version="1.0" encoding="utf-8"?>
 <pc:chgInfo xmlns:a="http://schemas.openxmlformats.org/drawingml/2006/main" xmlns:r="http://schemas.openxmlformats.org/officeDocument/2006/relationships" xmlns:ac="http://schemas.microsoft.com/office/drawing/2013/main/command" xmlns:pc="http://schemas.microsoft.com/office/powerpoint/2013/main/command">
+  <pc:docChgLst>
+    <pc:chgData name="Martin Kulov" userId="ef1e485ad48d3184" providerId="LiveId" clId="{C73B08BA-54A5-45EC-A1EA-C3F45019A129}"/>
+  </pc:docChgLst>
   <pc:docChgLst>
     <pc:chgData name="Nikolay Dermendzhiev" userId="bcba64b7601bcff1" providerId="LiveId" clId="{332DD6E6-C5C5-4CE2-BE61-FA3E364D0244}"/>
     <pc:docChg chg="modSld">
@@ -435,9 +438,6 @@
         </pc:sldLayoutChg>
       </pc:sldMasterChg>
     </pc:docChg>
-  </pc:docChgLst>
-  <pc:docChgLst>
-    <pc:chgData name="Martin Kulov" userId="ef1e485ad48d3184" providerId="LiveId" clId="{C73B08BA-54A5-45EC-A1EA-C3F45019A129}"/>
   </pc:docChgLst>
 </pc:chgInfo>
 </file>
@@ -9023,7 +9023,7 @@
               <a:rPr lang="en-US" sz="1800" dirty="0">
                 <a:hlinkClick r:id="rId2"/>
               </a:rPr>
-              <a:t>https://bit.ly/dotnetconf-sofia-blazor</a:t>
+              <a:t>https://bit.ly/sofia-dotnetconf-blazor</a:t>
             </a:r>
             <a:endParaRPr lang="en-US" sz="1800" dirty="0"/>
           </a:p>

</xml_diff>